<commit_message>
Minor fixes + added architecture file
</commit_message>
<xml_diff>
--- a/Phase 1/Slides.pptx
+++ b/Phase 1/Slides.pptx
@@ -7579,37 +7579,9 @@
           </a:p>
         </p:txBody>
       </p:sp>
-      <p:pic>
-        <p:nvPicPr>
+      <p:sp>
+        <p:nvSpPr>
           <p:cNvPr id="155" name="Shape 155"/>
-          <p:cNvPicPr preferRelativeResize="0"/>
-          <p:nvPr/>
-        </p:nvPicPr>
-        <p:blipFill>
-          <a:blip r:embed="rId3">
-            <a:alphaModFix/>
-          </a:blip>
-          <a:stretch>
-            <a:fillRect/>
-          </a:stretch>
-        </p:blipFill>
-        <p:spPr>
-          <a:xfrm>
-            <a:off x="469275" y="1724043"/>
-            <a:ext cx="8205450" cy="2543432"/>
-          </a:xfrm>
-          <a:prstGeom prst="rect">
-            <a:avLst/>
-          </a:prstGeom>
-          <a:noFill/>
-          <a:ln>
-            <a:noFill/>
-          </a:ln>
-        </p:spPr>
-      </p:pic>
-      <p:sp>
-        <p:nvSpPr>
-          <p:cNvPr id="156" name="Shape 156"/>
           <p:cNvSpPr txBox="1"/>
           <p:nvPr/>
         </p:nvSpPr>
@@ -7656,12 +7628,12 @@
       </p:sp>
       <p:pic>
         <p:nvPicPr>
-          <p:cNvPr id="157" name="Shape 157"/>
+          <p:cNvPr id="156" name="Shape 156"/>
           <p:cNvPicPr preferRelativeResize="0"/>
           <p:nvPr/>
         </p:nvPicPr>
         <p:blipFill>
-          <a:blip r:embed="rId4">
+          <a:blip r:embed="rId3">
             <a:alphaModFix/>
           </a:blip>
           <a:stretch>
@@ -7671,6 +7643,34 @@
         <p:spPr>
           <a:xfrm rot="-5400000">
             <a:off x="1152187" y="3852688"/>
+            <a:ext cx="304176" cy="2042849"/>
+          </a:xfrm>
+          <a:prstGeom prst="rect">
+            <a:avLst/>
+          </a:prstGeom>
+          <a:noFill/>
+          <a:ln>
+            <a:noFill/>
+          </a:ln>
+        </p:spPr>
+      </p:pic>
+      <p:pic>
+        <p:nvPicPr>
+          <p:cNvPr id="157" name="Shape 157"/>
+          <p:cNvPicPr preferRelativeResize="0"/>
+          <p:nvPr/>
+        </p:nvPicPr>
+        <p:blipFill>
+          <a:blip r:embed="rId3">
+            <a:alphaModFix/>
+          </a:blip>
+          <a:stretch>
+            <a:fillRect/>
+          </a:stretch>
+        </p:blipFill>
+        <p:spPr>
+          <a:xfrm rot="-5400000">
+            <a:off x="3593637" y="3852688"/>
             <a:ext cx="304176" cy="2042849"/>
           </a:xfrm>
           <a:prstGeom prst="rect">
@@ -7689,7 +7689,7 @@
           <p:nvPr/>
         </p:nvPicPr>
         <p:blipFill>
-          <a:blip r:embed="rId4">
+          <a:blip r:embed="rId3">
             <a:alphaModFix/>
           </a:blip>
           <a:stretch>
@@ -7698,8 +7698,8 @@
         </p:blipFill>
         <p:spPr>
           <a:xfrm rot="-5400000">
-            <a:off x="3593637" y="3852688"/>
-            <a:ext cx="304176" cy="2042849"/>
+            <a:off x="6807462" y="3043699"/>
+            <a:ext cx="304176" cy="3660826"/>
           </a:xfrm>
           <a:prstGeom prst="rect">
             <a:avLst/>
@@ -7710,37 +7710,9 @@
           </a:ln>
         </p:spPr>
       </p:pic>
-      <p:pic>
-        <p:nvPicPr>
+      <p:sp>
+        <p:nvSpPr>
           <p:cNvPr id="159" name="Shape 159"/>
-          <p:cNvPicPr preferRelativeResize="0"/>
-          <p:nvPr/>
-        </p:nvPicPr>
-        <p:blipFill>
-          <a:blip r:embed="rId4">
-            <a:alphaModFix/>
-          </a:blip>
-          <a:stretch>
-            <a:fillRect/>
-          </a:stretch>
-        </p:blipFill>
-        <p:spPr>
-          <a:xfrm rot="-5400000">
-            <a:off x="6807462" y="3043699"/>
-            <a:ext cx="304176" cy="3660826"/>
-          </a:xfrm>
-          <a:prstGeom prst="rect">
-            <a:avLst/>
-          </a:prstGeom>
-          <a:noFill/>
-          <a:ln>
-            <a:noFill/>
-          </a:ln>
-        </p:spPr>
-      </p:pic>
-      <p:sp>
-        <p:nvSpPr>
-          <p:cNvPr id="160" name="Shape 160"/>
           <p:cNvSpPr txBox="1"/>
           <p:nvPr/>
         </p:nvSpPr>
@@ -7792,7 +7764,7 @@
       </p:sp>
       <p:sp>
         <p:nvSpPr>
-          <p:cNvPr id="161" name="Shape 161"/>
+          <p:cNvPr id="160" name="Shape 160"/>
           <p:cNvSpPr txBox="1"/>
           <p:nvPr/>
         </p:nvSpPr>
@@ -7839,7 +7811,7 @@
       </p:sp>
       <p:sp>
         <p:nvSpPr>
-          <p:cNvPr id="162" name="Shape 162"/>
+          <p:cNvPr id="161" name="Shape 161"/>
           <p:cNvSpPr txBox="1"/>
           <p:nvPr/>
         </p:nvSpPr>
@@ -7884,6 +7856,34 @@
           </a:p>
         </p:txBody>
       </p:sp>
+      <p:pic>
+        <p:nvPicPr>
+          <p:cNvPr id="162" name="Shape 162"/>
+          <p:cNvPicPr preferRelativeResize="0"/>
+          <p:nvPr/>
+        </p:nvPicPr>
+        <p:blipFill>
+          <a:blip r:embed="rId4">
+            <a:alphaModFix/>
+          </a:blip>
+          <a:stretch>
+            <a:fillRect/>
+          </a:stretch>
+        </p:blipFill>
+        <p:spPr>
+          <a:xfrm>
+            <a:off x="152400" y="1500126"/>
+            <a:ext cx="8839202" cy="2739003"/>
+          </a:xfrm>
+          <a:prstGeom prst="rect">
+            <a:avLst/>
+          </a:prstGeom>
+          <a:noFill/>
+          <a:ln>
+            <a:noFill/>
+          </a:ln>
+        </p:spPr>
+      </p:pic>
     </p:spTree>
   </p:cSld>
   <p:clrMapOvr>
@@ -8075,7 +8075,7 @@
             </a:pPr>
             <a:r>
               <a:rPr lang="en" sz="1800"/>
-              <a:t>When both users (the owner of the item and the user that found it) are close, MatchMore’s API will trigger a notification for both devices</a:t>
+              <a:t>When both users (the owner of the item and the user that found it) are close, MatchMore’s API will trigger a notification in both devices</a:t>
             </a:r>
             <a:endParaRPr sz="1800"/>
           </a:p>

</xml_diff>